<commit_message>
Added homework for 2. ASP.NET-Web-API
</commit_message>
<xml_diff>
--- a/2. ASP.NET-Web-API/ASP.NET-Web-API.pptx
+++ b/2. ASP.NET-Web-API/ASP.NET-Web-API.pptx
@@ -5,10 +5,10 @@
     <p:sldMasterId id="2147483672" r:id="rId1"/>
   </p:sldMasterIdLst>
   <p:notesMasterIdLst>
-    <p:notesMasterId r:id="rId34"/>
+    <p:notesMasterId r:id="rId31"/>
   </p:notesMasterIdLst>
   <p:handoutMasterIdLst>
-    <p:handoutMasterId r:id="rId35"/>
+    <p:handoutMasterId r:id="rId32"/>
   </p:handoutMasterIdLst>
   <p:sldIdLst>
     <p:sldId id="570" r:id="rId2"/>
@@ -39,15 +39,12 @@
     <p:sldId id="840" r:id="rId27"/>
     <p:sldId id="846" r:id="rId28"/>
     <p:sldId id="460" r:id="rId29"/>
-    <p:sldId id="847" r:id="rId30"/>
-    <p:sldId id="812" r:id="rId31"/>
-    <p:sldId id="835" r:id="rId32"/>
-    <p:sldId id="333" r:id="rId33"/>
+    <p:sldId id="333" r:id="rId30"/>
   </p:sldIdLst>
   <p:sldSz cx="9144000" cy="6858000" type="screen4x3"/>
   <p:notesSz cx="6881813" cy="9296400"/>
   <p:custDataLst>
-    <p:tags r:id="rId36"/>
+    <p:tags r:id="rId33"/>
   </p:custDataLst>
   <p:defaultTextStyle>
     <a:defPPr>
@@ -220,19 +217,16 @@
             <p14:sldId id="846"/>
           </p14:sldIdLst>
         </p14:section>
-        <p14:section name="Questions and Homework" id="{582018E1-BCD4-4B64-9021-AA7DC827860A}">
+        <p14:section name="Questions" id="{582018E1-BCD4-4B64-9021-AA7DC827860A}">
           <p14:sldIdLst>
             <p14:sldId id="460"/>
-            <p14:sldId id="847"/>
-            <p14:sldId id="812"/>
-            <p14:sldId id="835"/>
             <p14:sldId id="333"/>
           </p14:sldIdLst>
         </p14:section>
       </p14:sectionLst>
     </p:ext>
     <p:ext uri="{EFAFB233-063F-42B5-8137-9DF3F51BA10A}">
-      <p15:sldGuideLst xmlns:p15="http://schemas.microsoft.com/office/powerpoint/2012/main" xmlns="">
+      <p15:sldGuideLst xmlns:p15="http://schemas.microsoft.com/office/powerpoint/2012/main">
         <p15:guide id="1" orient="horz" pos="2160">
           <p15:clr>
             <a:srgbClr val="A4A3A4"/>
@@ -246,7 +240,7 @@
       </p15:sldGuideLst>
     </p:ext>
     <p:ext uri="{2D200454-40CA-4A62-9FC3-DE9A4176ACB9}">
-      <p15:notesGuideLst xmlns:p15="http://schemas.microsoft.com/office/powerpoint/2012/main" xmlns="">
+      <p15:notesGuideLst xmlns:p15="http://schemas.microsoft.com/office/powerpoint/2012/main">
         <p15:guide id="1" orient="horz" pos="2928">
           <p15:clr>
             <a:srgbClr val="A4A3A4"/>
@@ -378,7 +372,7 @@
             <a:fld id="{3BF7C7B5-275F-4D1F-9AB4-9255447DBC73}" type="datetimeFigureOut">
               <a:rPr lang="en-US"/>
               <a:pPr/>
-              <a:t>9/9/2014</a:t>
+              <a:t>10/27/2015</a:t>
             </a:fld>
             <a:endParaRPr lang="en-US" dirty="0"/>
           </a:p>
@@ -609,7 +603,7 @@
             <a:fld id="{9B46F231-FB2B-4655-A644-E2477325E686}" type="datetimeFigureOut">
               <a:rPr lang="en-US"/>
               <a:pPr/>
-              <a:t>9/9/2014</a:t>
+              <a:t>10/27/2015</a:t>
             </a:fld>
             <a:endParaRPr lang="en-US" dirty="0"/>
           </a:p>
@@ -1198,176 +1192,6 @@
     <p:extLst>
       <p:ext uri="{BB962C8B-B14F-4D97-AF65-F5344CB8AC3E}">
         <p14:creationId xmlns:p14="http://schemas.microsoft.com/office/powerpoint/2010/main" val="3727788842"/>
-      </p:ext>
-    </p:extLst>
-  </p:cSld>
-  <p:clrMapOvr>
-    <a:masterClrMapping/>
-  </p:clrMapOvr>
-</p:notes>
-</file>
-
-<file path=ppt/notesSlides/notesSlide4.xml><?xml version="1.0" encoding="utf-8"?>
-<p:notes xmlns:a="http://schemas.openxmlformats.org/drawingml/2006/main" xmlns:r="http://schemas.openxmlformats.org/officeDocument/2006/relationships" xmlns:p="http://schemas.openxmlformats.org/presentationml/2006/main">
-  <p:cSld>
-    <p:spTree>
-      <p:nvGrpSpPr>
-        <p:cNvPr id="1" name=""/>
-        <p:cNvGrpSpPr/>
-        <p:nvPr/>
-      </p:nvGrpSpPr>
-      <p:grpSpPr>
-        <a:xfrm>
-          <a:off x="0" y="0"/>
-          <a:ext cx="0" cy="0"/>
-          <a:chOff x="0" y="0"/>
-          <a:chExt cx="0" cy="0"/>
-        </a:xfrm>
-      </p:grpSpPr>
-      <p:sp>
-        <p:nvSpPr>
-          <p:cNvPr id="2" name="Slide Image Placeholder 1"/>
-          <p:cNvSpPr>
-            <a:spLocks noGrp="1" noRot="1" noChangeAspect="1"/>
-          </p:cNvSpPr>
-          <p:nvPr>
-            <p:ph type="sldImg"/>
-          </p:nvPr>
-        </p:nvSpPr>
-        <p:spPr/>
-      </p:sp>
-      <p:sp>
-        <p:nvSpPr>
-          <p:cNvPr id="3" name="Notes Placeholder 2"/>
-          <p:cNvSpPr>
-            <a:spLocks noGrp="1"/>
-          </p:cNvSpPr>
-          <p:nvPr>
-            <p:ph type="body" idx="1"/>
-          </p:nvPr>
-        </p:nvSpPr>
-        <p:spPr/>
-        <p:txBody>
-          <a:bodyPr/>
-          <a:lstStyle/>
-          <a:p>
-            <a:endParaRPr lang="en-US" dirty="0"/>
-          </a:p>
-        </p:txBody>
-      </p:sp>
-      <p:sp>
-        <p:nvSpPr>
-          <p:cNvPr id="4" name="Slide Number Placeholder 3"/>
-          <p:cNvSpPr>
-            <a:spLocks noGrp="1"/>
-          </p:cNvSpPr>
-          <p:nvPr>
-            <p:ph type="sldNum" sz="quarter" idx="10"/>
-          </p:nvPr>
-        </p:nvSpPr>
-        <p:spPr/>
-        <p:txBody>
-          <a:bodyPr/>
-          <a:lstStyle/>
-          <a:p>
-            <a:fld id="{6FB4F6EA-423E-42DF-9292-215E7D886C4E}" type="slidenum">
-              <a:rPr lang="en-US" smtClean="0"/>
-              <a:pPr/>
-              <a:t>29</a:t>
-            </a:fld>
-            <a:endParaRPr lang="en-US" dirty="0"/>
-          </a:p>
-        </p:txBody>
-      </p:sp>
-    </p:spTree>
-    <p:extLst>
-      <p:ext uri="{BB962C8B-B14F-4D97-AF65-F5344CB8AC3E}">
-        <p14:creationId xmlns:p14="http://schemas.microsoft.com/office/powerpoint/2010/main" val="238311669"/>
-      </p:ext>
-    </p:extLst>
-  </p:cSld>
-  <p:clrMapOvr>
-    <a:masterClrMapping/>
-  </p:clrMapOvr>
-</p:notes>
-</file>
-
-<file path=ppt/notesSlides/notesSlide5.xml><?xml version="1.0" encoding="utf-8"?>
-<p:notes xmlns:a="http://schemas.openxmlformats.org/drawingml/2006/main" xmlns:r="http://schemas.openxmlformats.org/officeDocument/2006/relationships" xmlns:p="http://schemas.openxmlformats.org/presentationml/2006/main">
-  <p:cSld>
-    <p:spTree>
-      <p:nvGrpSpPr>
-        <p:cNvPr id="1" name=""/>
-        <p:cNvGrpSpPr/>
-        <p:nvPr/>
-      </p:nvGrpSpPr>
-      <p:grpSpPr>
-        <a:xfrm>
-          <a:off x="0" y="0"/>
-          <a:ext cx="0" cy="0"/>
-          <a:chOff x="0" y="0"/>
-          <a:chExt cx="0" cy="0"/>
-        </a:xfrm>
-      </p:grpSpPr>
-      <p:sp>
-        <p:nvSpPr>
-          <p:cNvPr id="2" name="Slide Image Placeholder 1"/>
-          <p:cNvSpPr>
-            <a:spLocks noGrp="1" noRot="1" noChangeAspect="1"/>
-          </p:cNvSpPr>
-          <p:nvPr>
-            <p:ph type="sldImg"/>
-          </p:nvPr>
-        </p:nvSpPr>
-        <p:spPr/>
-      </p:sp>
-      <p:sp>
-        <p:nvSpPr>
-          <p:cNvPr id="3" name="Notes Placeholder 2"/>
-          <p:cNvSpPr>
-            <a:spLocks noGrp="1"/>
-          </p:cNvSpPr>
-          <p:nvPr>
-            <p:ph type="body" idx="1"/>
-          </p:nvPr>
-        </p:nvSpPr>
-        <p:spPr/>
-        <p:txBody>
-          <a:bodyPr/>
-          <a:lstStyle/>
-          <a:p>
-            <a:endParaRPr lang="en-US" dirty="0"/>
-          </a:p>
-        </p:txBody>
-      </p:sp>
-      <p:sp>
-        <p:nvSpPr>
-          <p:cNvPr id="4" name="Slide Number Placeholder 3"/>
-          <p:cNvSpPr>
-            <a:spLocks noGrp="1"/>
-          </p:cNvSpPr>
-          <p:nvPr>
-            <p:ph type="sldNum" sz="quarter" idx="10"/>
-          </p:nvPr>
-        </p:nvSpPr>
-        <p:spPr/>
-        <p:txBody>
-          <a:bodyPr/>
-          <a:lstStyle/>
-          <a:p>
-            <a:fld id="{6FB4F6EA-423E-42DF-9292-215E7D886C4E}" type="slidenum">
-              <a:rPr lang="en-US" smtClean="0"/>
-              <a:pPr/>
-              <a:t>30</a:t>
-            </a:fld>
-            <a:endParaRPr lang="en-US" dirty="0"/>
-          </a:p>
-        </p:txBody>
-      </p:sp>
-    </p:spTree>
-    <p:extLst>
-      <p:ext uri="{BB962C8B-B14F-4D97-AF65-F5344CB8AC3E}">
-        <p14:creationId xmlns:p14="http://schemas.microsoft.com/office/powerpoint/2010/main" val="238311669"/>
       </p:ext>
     </p:extLst>
   </p:cSld>
@@ -17845,678 +17669,6 @@
       </p:grpSpPr>
       <p:sp>
         <p:nvSpPr>
-          <p:cNvPr id="4" name="Title 3"/>
-          <p:cNvSpPr>
-            <a:spLocks noGrp="1"/>
-          </p:cNvSpPr>
-          <p:nvPr>
-            <p:ph type="title"/>
-          </p:nvPr>
-        </p:nvSpPr>
-        <p:spPr/>
-        <p:txBody>
-          <a:bodyPr/>
-          <a:lstStyle/>
-          <a:p>
-            <a:r>
-              <a:rPr lang="en-US" dirty="0" smtClean="0"/>
-              <a:t>Homework</a:t>
-            </a:r>
-            <a:endParaRPr lang="en-US" dirty="0"/>
-          </a:p>
-        </p:txBody>
-      </p:sp>
-      <p:sp>
-        <p:nvSpPr>
-          <p:cNvPr id="5" name="Content Placeholder 4"/>
-          <p:cNvSpPr>
-            <a:spLocks noGrp="1"/>
-          </p:cNvSpPr>
-          <p:nvPr>
-            <p:ph idx="1"/>
-          </p:nvPr>
-        </p:nvSpPr>
-        <p:spPr>
-          <a:xfrm>
-            <a:off x="228600" y="762000"/>
-            <a:ext cx="8763000" cy="5867400"/>
-          </a:xfrm>
-        </p:spPr>
-        <p:txBody>
-          <a:bodyPr/>
-          <a:lstStyle/>
-          <a:p>
-            <a:pPr marL="514350" indent="-514350">
-              <a:spcBef>
-                <a:spcPts val="0"/>
-              </a:spcBef>
-              <a:spcAft>
-                <a:spcPts val="300"/>
-              </a:spcAft>
-              <a:buFont typeface="+mj-lt"/>
-              <a:buAutoNum type="arabicPeriod"/>
-            </a:pPr>
-            <a:r>
-              <a:rPr lang="en-US" dirty="0"/>
-              <a:t>Using ASP.NET Web API </a:t>
-            </a:r>
-            <a:r>
-              <a:rPr lang="en-US" dirty="0" smtClean="0"/>
-              <a:t>create REST services for the Student System demo from Code First presentation in the Databases course.</a:t>
-            </a:r>
-            <a:br>
-              <a:rPr lang="en-US" dirty="0" smtClean="0"/>
-            </a:br>
-            <a:r>
-              <a:rPr lang="en-US" dirty="0" smtClean="0"/>
-              <a:t>Use high-quality code, use Repository pattern and create services for all available models.</a:t>
-            </a:r>
-            <a:r>
-              <a:rPr lang="en-US" dirty="0"/>
-              <a:t/>
-            </a:r>
-            <a:br>
-              <a:rPr lang="en-US" dirty="0"/>
-            </a:br>
-            <a:r>
-              <a:rPr lang="en-US" dirty="0" smtClean="0"/>
-              <a:t>Do not use scaffolding.</a:t>
-            </a:r>
-          </a:p>
-        </p:txBody>
-      </p:sp>
-      <p:sp>
-        <p:nvSpPr>
-          <p:cNvPr id="2" name="Slide Number Placeholder 1"/>
-          <p:cNvSpPr>
-            <a:spLocks noGrp="1"/>
-          </p:cNvSpPr>
-          <p:nvPr>
-            <p:ph type="sldNum" sz="quarter" idx="10"/>
-          </p:nvPr>
-        </p:nvSpPr>
-        <p:spPr/>
-        <p:txBody>
-          <a:bodyPr/>
-          <a:lstStyle/>
-          <a:p>
-            <a:pPr>
-              <a:defRPr/>
-            </a:pPr>
-            <a:fld id="{58452FF4-89E3-4D1B-9927-2DBDC00E58D7}" type="slidenum">
-              <a:rPr lang="en-US" smtClean="0"/>
-              <a:pPr>
-                <a:defRPr/>
-              </a:pPr>
-              <a:t>29</a:t>
-            </a:fld>
-            <a:endParaRPr lang="en-US" dirty="0"/>
-          </a:p>
-        </p:txBody>
-      </p:sp>
-    </p:spTree>
-    <p:extLst>
-      <p:ext uri="{BB962C8B-B14F-4D97-AF65-F5344CB8AC3E}">
-        <p14:creationId xmlns:p14="http://schemas.microsoft.com/office/powerpoint/2010/main" val="803198198"/>
-      </p:ext>
-    </p:extLst>
-  </p:cSld>
-  <p:clrMapOvr>
-    <a:masterClrMapping/>
-  </p:clrMapOvr>
-  <p:timing>
-    <p:tnLst>
-      <p:par>
-        <p:cTn id="1" dur="indefinite" restart="never" nodeType="tmRoot"/>
-      </p:par>
-    </p:tnLst>
-  </p:timing>
-</p:sld>
-</file>
-
-<file path=ppt/slides/slide3.xml><?xml version="1.0" encoding="utf-8"?>
-<p:sld xmlns:a="http://schemas.openxmlformats.org/drawingml/2006/main" xmlns:r="http://schemas.openxmlformats.org/officeDocument/2006/relationships" xmlns:p="http://schemas.openxmlformats.org/presentationml/2006/main">
-  <p:cSld>
-    <p:spTree>
-      <p:nvGrpSpPr>
-        <p:cNvPr id="1" name=""/>
-        <p:cNvGrpSpPr/>
-        <p:nvPr/>
-      </p:nvGrpSpPr>
-      <p:grpSpPr>
-        <a:xfrm>
-          <a:off x="0" y="0"/>
-          <a:ext cx="0" cy="0"/>
-          <a:chOff x="0" y="0"/>
-          <a:chExt cx="0" cy="0"/>
-        </a:xfrm>
-      </p:grpSpPr>
-      <p:sp>
-        <p:nvSpPr>
-          <p:cNvPr id="5" name="Title 4"/>
-          <p:cNvSpPr>
-            <a:spLocks noGrp="1"/>
-          </p:cNvSpPr>
-          <p:nvPr>
-            <p:ph type="ctrTitle"/>
-          </p:nvPr>
-        </p:nvSpPr>
-        <p:spPr>
-          <a:xfrm>
-            <a:off x="609600" y="1295400"/>
-            <a:ext cx="7924800" cy="685800"/>
-          </a:xfrm>
-        </p:spPr>
-        <p:txBody>
-          <a:bodyPr/>
-          <a:lstStyle/>
-          <a:p>
-            <a:r>
-              <a:rPr lang="en-US" dirty="0" smtClean="0"/>
-              <a:t>What is ASP.NET Web API?</a:t>
-            </a:r>
-            <a:endParaRPr lang="en-US" dirty="0"/>
-          </a:p>
-        </p:txBody>
-      </p:sp>
-      <p:pic>
-        <p:nvPicPr>
-          <p:cNvPr id="3074" name="Picture 2" descr="http://stebet.net/wp-content/uploads/2013/06/asp.net-logo-400x300.png"/>
-          <p:cNvPicPr>
-            <a:picLocks noChangeAspect="1" noChangeArrowheads="1"/>
-          </p:cNvPicPr>
-          <p:nvPr/>
-        </p:nvPicPr>
-        <p:blipFill>
-          <a:blip r:embed="rId2">
-            <a:extLst>
-              <a:ext uri="{28A0092B-C50C-407E-A947-70E740481C1C}">
-                <a14:useLocalDpi xmlns:a14="http://schemas.microsoft.com/office/drawing/2010/main" val="0"/>
-              </a:ext>
-            </a:extLst>
-          </a:blip>
-          <a:srcRect/>
-          <a:stretch>
-            <a:fillRect/>
-          </a:stretch>
-        </p:blipFill>
-        <p:spPr bwMode="auto">
-          <a:xfrm>
-            <a:off x="2667000" y="2514600"/>
-            <a:ext cx="3810000" cy="2857500"/>
-          </a:xfrm>
-          <a:prstGeom prst="roundRect">
-            <a:avLst>
-              <a:gd name="adj" fmla="val 8594"/>
-            </a:avLst>
-          </a:prstGeom>
-          <a:solidFill>
-            <a:srgbClr val="FFFFFF">
-              <a:shade val="85000"/>
-            </a:srgbClr>
-          </a:solidFill>
-          <a:ln>
-            <a:noFill/>
-          </a:ln>
-          <a:effectLst>
-            <a:reflection blurRad="12700" stA="38000" endPos="28000" dist="5000" dir="5400000" sy="-100000" algn="bl" rotWithShape="0"/>
-          </a:effectLst>
-          <a:extLst/>
-        </p:spPr>
-      </p:pic>
-    </p:spTree>
-    <p:extLst>
-      <p:ext uri="{BB962C8B-B14F-4D97-AF65-F5344CB8AC3E}">
-        <p14:creationId xmlns:p14="http://schemas.microsoft.com/office/powerpoint/2010/main" val="2711882485"/>
-      </p:ext>
-    </p:extLst>
-  </p:cSld>
-  <p:clrMapOvr>
-    <a:masterClrMapping/>
-  </p:clrMapOvr>
-  <p:timing>
-    <p:tnLst>
-      <p:par>
-        <p:cTn id="1" dur="indefinite" restart="never" nodeType="tmRoot"/>
-      </p:par>
-    </p:tnLst>
-  </p:timing>
-</p:sld>
-</file>
-
-<file path=ppt/slides/slide30.xml><?xml version="1.0" encoding="utf-8"?>
-<p:sld xmlns:a="http://schemas.openxmlformats.org/drawingml/2006/main" xmlns:r="http://schemas.openxmlformats.org/officeDocument/2006/relationships" xmlns:p="http://schemas.openxmlformats.org/presentationml/2006/main">
-  <p:cSld>
-    <p:spTree>
-      <p:nvGrpSpPr>
-        <p:cNvPr id="1" name=""/>
-        <p:cNvGrpSpPr/>
-        <p:nvPr/>
-      </p:nvGrpSpPr>
-      <p:grpSpPr>
-        <a:xfrm>
-          <a:off x="0" y="0"/>
-          <a:ext cx="0" cy="0"/>
-          <a:chOff x="0" y="0"/>
-          <a:chExt cx="0" cy="0"/>
-        </a:xfrm>
-      </p:grpSpPr>
-      <p:sp>
-        <p:nvSpPr>
-          <p:cNvPr id="4" name="Title 3"/>
-          <p:cNvSpPr>
-            <a:spLocks noGrp="1"/>
-          </p:cNvSpPr>
-          <p:nvPr>
-            <p:ph type="title"/>
-          </p:nvPr>
-        </p:nvSpPr>
-        <p:spPr/>
-        <p:txBody>
-          <a:bodyPr/>
-          <a:lstStyle/>
-          <a:p>
-            <a:r>
-              <a:rPr lang="en-US" dirty="0" smtClean="0"/>
-              <a:t>Homework</a:t>
-            </a:r>
-            <a:endParaRPr lang="en-US" dirty="0"/>
-          </a:p>
-        </p:txBody>
-      </p:sp>
-      <p:sp>
-        <p:nvSpPr>
-          <p:cNvPr id="5" name="Content Placeholder 4"/>
-          <p:cNvSpPr>
-            <a:spLocks noGrp="1"/>
-          </p:cNvSpPr>
-          <p:nvPr>
-            <p:ph idx="1"/>
-          </p:nvPr>
-        </p:nvSpPr>
-        <p:spPr>
-          <a:xfrm>
-            <a:off x="228600" y="762000"/>
-            <a:ext cx="8763000" cy="5867400"/>
-          </a:xfrm>
-        </p:spPr>
-        <p:txBody>
-          <a:bodyPr/>
-          <a:lstStyle/>
-          <a:p>
-            <a:pPr marL="514350" indent="-514350">
-              <a:spcBef>
-                <a:spcPts val="0"/>
-              </a:spcBef>
-              <a:spcAft>
-                <a:spcPts val="300"/>
-              </a:spcAft>
-              <a:buFont typeface="+mj-lt"/>
-              <a:buAutoNum type="arabicPeriod" startAt="2"/>
-            </a:pPr>
-            <a:r>
-              <a:rPr lang="en-US" dirty="0"/>
-              <a:t>Using ASP.NET Web API and Entity Framework (database first or code first) create </a:t>
-            </a:r>
-            <a:r>
-              <a:rPr lang="en-US" dirty="0" smtClean="0"/>
-              <a:t>a database </a:t>
-            </a:r>
-            <a:r>
-              <a:rPr lang="en-US" dirty="0"/>
-              <a:t>and web services with full CRUD (create, read, </a:t>
-            </a:r>
-            <a:r>
-              <a:rPr lang="en-US" dirty="0" smtClean="0"/>
-              <a:t>update, delete) </a:t>
-            </a:r>
-            <a:r>
-              <a:rPr lang="en-US" dirty="0"/>
-              <a:t>operations for hierarchy of following classes:</a:t>
-            </a:r>
-          </a:p>
-          <a:p>
-            <a:pPr marL="1080000" lvl="1" indent="-514350">
-              <a:spcBef>
-                <a:spcPts val="0"/>
-              </a:spcBef>
-              <a:spcAft>
-                <a:spcPts val="300"/>
-              </a:spcAft>
-            </a:pPr>
-            <a:r>
-              <a:rPr lang="en-US" dirty="0" smtClean="0"/>
-              <a:t>Artists (Name, Country, </a:t>
-            </a:r>
-            <a:r>
-              <a:rPr lang="en-US" dirty="0" err="1" smtClean="0"/>
-              <a:t>DateOfBirth</a:t>
-            </a:r>
-            <a:r>
-              <a:rPr lang="en-US" dirty="0" smtClean="0"/>
-              <a:t>, etc.)</a:t>
-            </a:r>
-          </a:p>
-          <a:p>
-            <a:pPr marL="1080000" lvl="1" indent="-514350">
-              <a:spcBef>
-                <a:spcPts val="0"/>
-              </a:spcBef>
-              <a:spcAft>
-                <a:spcPts val="300"/>
-              </a:spcAft>
-            </a:pPr>
-            <a:r>
-              <a:rPr lang="en-US" dirty="0" smtClean="0"/>
-              <a:t>Albums (Title, Year, Producer, etc.)</a:t>
-            </a:r>
-          </a:p>
-          <a:p>
-            <a:pPr marL="1080000" lvl="1" indent="-514350">
-              <a:spcBef>
-                <a:spcPts val="0"/>
-              </a:spcBef>
-              <a:spcAft>
-                <a:spcPts val="300"/>
-              </a:spcAft>
-            </a:pPr>
-            <a:r>
-              <a:rPr lang="en-US" dirty="0" smtClean="0"/>
-              <a:t>Songs (Title, Year, Genre, etc.)</a:t>
-            </a:r>
-            <a:endParaRPr lang="en-US" dirty="0"/>
-          </a:p>
-          <a:p>
-            <a:pPr marL="1080000" lvl="1" indent="-514350">
-              <a:spcBef>
-                <a:spcPts val="0"/>
-              </a:spcBef>
-              <a:spcAft>
-                <a:spcPts val="300"/>
-              </a:spcAft>
-            </a:pPr>
-            <a:r>
-              <a:rPr lang="en-US" dirty="0" smtClean="0"/>
-              <a:t>Every album has a list of artists</a:t>
-            </a:r>
-          </a:p>
-          <a:p>
-            <a:pPr marL="1080000" lvl="1" indent="-514350">
-              <a:spcBef>
-                <a:spcPts val="0"/>
-              </a:spcBef>
-              <a:spcAft>
-                <a:spcPts val="300"/>
-              </a:spcAft>
-            </a:pPr>
-            <a:r>
-              <a:rPr lang="en-US" dirty="0"/>
-              <a:t>Every </a:t>
-            </a:r>
-            <a:r>
-              <a:rPr lang="en-US" dirty="0" smtClean="0"/>
-              <a:t>song has artist</a:t>
-            </a:r>
-            <a:endParaRPr lang="en-US" dirty="0"/>
-          </a:p>
-          <a:p>
-            <a:pPr marL="1080000" lvl="1" indent="-514350">
-              <a:spcBef>
-                <a:spcPts val="0"/>
-              </a:spcBef>
-              <a:spcAft>
-                <a:spcPts val="300"/>
-              </a:spcAft>
-            </a:pPr>
-            <a:r>
-              <a:rPr lang="en-US" dirty="0" smtClean="0"/>
-              <a:t>Every album has list of songs</a:t>
-            </a:r>
-            <a:endParaRPr lang="en-US" dirty="0"/>
-          </a:p>
-        </p:txBody>
-      </p:sp>
-      <p:sp>
-        <p:nvSpPr>
-          <p:cNvPr id="2" name="Slide Number Placeholder 1"/>
-          <p:cNvSpPr>
-            <a:spLocks noGrp="1"/>
-          </p:cNvSpPr>
-          <p:nvPr>
-            <p:ph type="sldNum" sz="quarter" idx="10"/>
-          </p:nvPr>
-        </p:nvSpPr>
-        <p:spPr/>
-        <p:txBody>
-          <a:bodyPr/>
-          <a:lstStyle/>
-          <a:p>
-            <a:pPr>
-              <a:defRPr/>
-            </a:pPr>
-            <a:fld id="{58452FF4-89E3-4D1B-9927-2DBDC00E58D7}" type="slidenum">
-              <a:rPr lang="en-US" smtClean="0"/>
-              <a:pPr>
-                <a:defRPr/>
-              </a:pPr>
-              <a:t>30</a:t>
-            </a:fld>
-            <a:endParaRPr lang="en-US" dirty="0"/>
-          </a:p>
-        </p:txBody>
-      </p:sp>
-    </p:spTree>
-    <p:extLst>
-      <p:ext uri="{BB962C8B-B14F-4D97-AF65-F5344CB8AC3E}">
-        <p14:creationId xmlns:p14="http://schemas.microsoft.com/office/powerpoint/2010/main" val="2320107476"/>
-      </p:ext>
-    </p:extLst>
-  </p:cSld>
-  <p:clrMapOvr>
-    <a:masterClrMapping/>
-  </p:clrMapOvr>
-  <p:timing>
-    <p:tnLst>
-      <p:par>
-        <p:cTn id="1" dur="indefinite" restart="never" nodeType="tmRoot"/>
-      </p:par>
-    </p:tnLst>
-  </p:timing>
-</p:sld>
-</file>
-
-<file path=ppt/slides/slide31.xml><?xml version="1.0" encoding="utf-8"?>
-<p:sld xmlns:a="http://schemas.openxmlformats.org/drawingml/2006/main" xmlns:r="http://schemas.openxmlformats.org/officeDocument/2006/relationships" xmlns:p="http://schemas.openxmlformats.org/presentationml/2006/main">
-  <p:cSld>
-    <p:spTree>
-      <p:nvGrpSpPr>
-        <p:cNvPr id="1" name=""/>
-        <p:cNvGrpSpPr/>
-        <p:nvPr/>
-      </p:nvGrpSpPr>
-      <p:grpSpPr>
-        <a:xfrm>
-          <a:off x="0" y="0"/>
-          <a:ext cx="0" cy="0"/>
-          <a:chOff x="0" y="0"/>
-          <a:chExt cx="0" cy="0"/>
-        </a:xfrm>
-      </p:grpSpPr>
-      <p:sp>
-        <p:nvSpPr>
-          <p:cNvPr id="2" name="Title 1"/>
-          <p:cNvSpPr>
-            <a:spLocks noGrp="1"/>
-          </p:cNvSpPr>
-          <p:nvPr>
-            <p:ph type="title"/>
-          </p:nvPr>
-        </p:nvSpPr>
-        <p:spPr/>
-        <p:txBody>
-          <a:bodyPr/>
-          <a:lstStyle/>
-          <a:p>
-            <a:r>
-              <a:rPr lang="en-US" dirty="0" smtClean="0"/>
-              <a:t>Homework (2)</a:t>
-            </a:r>
-            <a:endParaRPr lang="en-US" dirty="0"/>
-          </a:p>
-        </p:txBody>
-      </p:sp>
-      <p:sp>
-        <p:nvSpPr>
-          <p:cNvPr id="3" name="Content Placeholder 2"/>
-          <p:cNvSpPr>
-            <a:spLocks noGrp="1"/>
-          </p:cNvSpPr>
-          <p:nvPr>
-            <p:ph idx="1"/>
-          </p:nvPr>
-        </p:nvSpPr>
-        <p:spPr>
-          <a:xfrm>
-            <a:off x="228600" y="838200"/>
-            <a:ext cx="8686800" cy="5791200"/>
-          </a:xfrm>
-        </p:spPr>
-        <p:txBody>
-          <a:bodyPr/>
-          <a:lstStyle/>
-          <a:p>
-            <a:pPr marL="514350" indent="-514350">
-              <a:buFont typeface="+mj-lt"/>
-              <a:buAutoNum type="arabicPeriod" startAt="3"/>
-            </a:pPr>
-            <a:r>
-              <a:rPr lang="en-US" dirty="0"/>
-              <a:t>Create console application and demonstrate the use of all service operations using the </a:t>
-            </a:r>
-            <a:r>
-              <a:rPr lang="en-US" dirty="0" err="1"/>
-              <a:t>HttpClient</a:t>
-            </a:r>
-            <a:r>
-              <a:rPr lang="en-US" dirty="0"/>
-              <a:t> class (with both JSON and XML</a:t>
-            </a:r>
-            <a:r>
-              <a:rPr lang="en-US" dirty="0" smtClean="0"/>
-              <a:t>)</a:t>
-            </a:r>
-          </a:p>
-          <a:p>
-            <a:pPr marL="514350" indent="-514350">
-              <a:buFont typeface="+mj-lt"/>
-              <a:buAutoNum type="arabicPeriod" startAt="3"/>
-            </a:pPr>
-            <a:r>
-              <a:rPr lang="en-US" dirty="0" smtClean="0"/>
-              <a:t>* Create JavaScript-based single page application and consume the service to display user interface for:</a:t>
-            </a:r>
-          </a:p>
-          <a:p>
-            <a:pPr marL="1080000" lvl="1" indent="-514350"/>
-            <a:r>
-              <a:rPr lang="en-US" dirty="0" smtClean="0"/>
-              <a:t>Creating, updating and deleting artists, songs and albums (with cascade deleting)</a:t>
-            </a:r>
-          </a:p>
-          <a:p>
-            <a:pPr marL="1080000" lvl="1" indent="-514350"/>
-            <a:r>
-              <a:rPr lang="en-US" dirty="0" smtClean="0"/>
-              <a:t>Show </a:t>
-            </a:r>
-            <a:r>
-              <a:rPr lang="en-US" dirty="0" err="1" smtClean="0"/>
-              <a:t>pageable</a:t>
-            </a:r>
-            <a:r>
-              <a:rPr lang="en-US" dirty="0" smtClean="0"/>
-              <a:t>, sortable and filterable artists, songs</a:t>
-            </a:r>
-            <a:r>
-              <a:rPr lang="bg-BG" dirty="0" smtClean="0"/>
-              <a:t> </a:t>
-            </a:r>
-            <a:r>
-              <a:rPr lang="en-US" dirty="0" smtClean="0"/>
-              <a:t>and albums using OData</a:t>
-            </a:r>
-            <a:endParaRPr lang="en-US" dirty="0"/>
-          </a:p>
-        </p:txBody>
-      </p:sp>
-      <p:sp>
-        <p:nvSpPr>
-          <p:cNvPr id="4" name="Slide Number Placeholder 3"/>
-          <p:cNvSpPr>
-            <a:spLocks noGrp="1"/>
-          </p:cNvSpPr>
-          <p:nvPr>
-            <p:ph type="sldNum" sz="quarter" idx="10"/>
-          </p:nvPr>
-        </p:nvSpPr>
-        <p:spPr/>
-        <p:txBody>
-          <a:bodyPr/>
-          <a:lstStyle/>
-          <a:p>
-            <a:pPr>
-              <a:defRPr/>
-            </a:pPr>
-            <a:fld id="{58452FF4-89E3-4D1B-9927-2DBDC00E58D7}" type="slidenum">
-              <a:rPr lang="en-US" smtClean="0"/>
-              <a:pPr>
-                <a:defRPr/>
-              </a:pPr>
-              <a:t>31</a:t>
-            </a:fld>
-            <a:endParaRPr lang="en-US" dirty="0"/>
-          </a:p>
-        </p:txBody>
-      </p:sp>
-    </p:spTree>
-    <p:extLst>
-      <p:ext uri="{BB962C8B-B14F-4D97-AF65-F5344CB8AC3E}">
-        <p14:creationId xmlns:p14="http://schemas.microsoft.com/office/powerpoint/2010/main" val="3155951164"/>
-      </p:ext>
-    </p:extLst>
-  </p:cSld>
-  <p:clrMapOvr>
-    <a:masterClrMapping/>
-  </p:clrMapOvr>
-  <p:timing>
-    <p:tnLst>
-      <p:par>
-        <p:cTn id="1" dur="indefinite" restart="never" nodeType="tmRoot"/>
-      </p:par>
-    </p:tnLst>
-  </p:timing>
-</p:sld>
-</file>
-
-<file path=ppt/slides/slide32.xml><?xml version="1.0" encoding="utf-8"?>
-<p:sld xmlns:a="http://schemas.openxmlformats.org/drawingml/2006/main" xmlns:r="http://schemas.openxmlformats.org/officeDocument/2006/relationships" xmlns:p="http://schemas.openxmlformats.org/presentationml/2006/main">
-  <p:cSld>
-    <p:spTree>
-      <p:nvGrpSpPr>
-        <p:cNvPr id="1" name=""/>
-        <p:cNvGrpSpPr/>
-        <p:nvPr/>
-      </p:nvGrpSpPr>
-      <p:grpSpPr>
-        <a:xfrm>
-          <a:off x="0" y="0"/>
-          <a:ext cx="0" cy="0"/>
-          <a:chOff x="0" y="0"/>
-          <a:chExt cx="0" cy="0"/>
-        </a:xfrm>
-      </p:grpSpPr>
-      <p:sp>
-        <p:nvSpPr>
           <p:cNvPr id="3" name="Title 2"/>
           <p:cNvSpPr>
             <a:spLocks noGrp="1"/>
@@ -18961,7 +18113,7 @@
               <a:pPr>
                 <a:defRPr/>
               </a:pPr>
-              <a:t>32</a:t>
+              <a:t>29</a:t>
             </a:fld>
             <a:endParaRPr lang="en-US" dirty="0"/>
           </a:p>
@@ -18971,6 +18123,116 @@
     <p:extLst>
       <p:ext uri="{BB962C8B-B14F-4D97-AF65-F5344CB8AC3E}">
         <p14:creationId xmlns:p14="http://schemas.microsoft.com/office/powerpoint/2010/main" val="495879396"/>
+      </p:ext>
+    </p:extLst>
+  </p:cSld>
+  <p:clrMapOvr>
+    <a:masterClrMapping/>
+  </p:clrMapOvr>
+  <p:timing>
+    <p:tnLst>
+      <p:par>
+        <p:cTn id="1" dur="indefinite" restart="never" nodeType="tmRoot"/>
+      </p:par>
+    </p:tnLst>
+  </p:timing>
+</p:sld>
+</file>
+
+<file path=ppt/slides/slide3.xml><?xml version="1.0" encoding="utf-8"?>
+<p:sld xmlns:a="http://schemas.openxmlformats.org/drawingml/2006/main" xmlns:r="http://schemas.openxmlformats.org/officeDocument/2006/relationships" xmlns:p="http://schemas.openxmlformats.org/presentationml/2006/main">
+  <p:cSld>
+    <p:spTree>
+      <p:nvGrpSpPr>
+        <p:cNvPr id="1" name=""/>
+        <p:cNvGrpSpPr/>
+        <p:nvPr/>
+      </p:nvGrpSpPr>
+      <p:grpSpPr>
+        <a:xfrm>
+          <a:off x="0" y="0"/>
+          <a:ext cx="0" cy="0"/>
+          <a:chOff x="0" y="0"/>
+          <a:chExt cx="0" cy="0"/>
+        </a:xfrm>
+      </p:grpSpPr>
+      <p:sp>
+        <p:nvSpPr>
+          <p:cNvPr id="5" name="Title 4"/>
+          <p:cNvSpPr>
+            <a:spLocks noGrp="1"/>
+          </p:cNvSpPr>
+          <p:nvPr>
+            <p:ph type="ctrTitle"/>
+          </p:nvPr>
+        </p:nvSpPr>
+        <p:spPr>
+          <a:xfrm>
+            <a:off x="609600" y="1295400"/>
+            <a:ext cx="7924800" cy="685800"/>
+          </a:xfrm>
+        </p:spPr>
+        <p:txBody>
+          <a:bodyPr/>
+          <a:lstStyle/>
+          <a:p>
+            <a:r>
+              <a:rPr lang="en-US" dirty="0" smtClean="0"/>
+              <a:t>What is ASP.NET Web API?</a:t>
+            </a:r>
+            <a:endParaRPr lang="en-US" dirty="0"/>
+          </a:p>
+        </p:txBody>
+      </p:sp>
+      <p:pic>
+        <p:nvPicPr>
+          <p:cNvPr id="3074" name="Picture 2" descr="http://stebet.net/wp-content/uploads/2013/06/asp.net-logo-400x300.png"/>
+          <p:cNvPicPr>
+            <a:picLocks noChangeAspect="1" noChangeArrowheads="1"/>
+          </p:cNvPicPr>
+          <p:nvPr/>
+        </p:nvPicPr>
+        <p:blipFill>
+          <a:blip r:embed="rId2">
+            <a:extLst>
+              <a:ext uri="{28A0092B-C50C-407E-A947-70E740481C1C}">
+                <a14:useLocalDpi xmlns:a14="http://schemas.microsoft.com/office/drawing/2010/main" val="0"/>
+              </a:ext>
+            </a:extLst>
+          </a:blip>
+          <a:srcRect/>
+          <a:stretch>
+            <a:fillRect/>
+          </a:stretch>
+        </p:blipFill>
+        <p:spPr bwMode="auto">
+          <a:xfrm>
+            <a:off x="2667000" y="2514600"/>
+            <a:ext cx="3810000" cy="2857500"/>
+          </a:xfrm>
+          <a:prstGeom prst="roundRect">
+            <a:avLst>
+              <a:gd name="adj" fmla="val 8594"/>
+            </a:avLst>
+          </a:prstGeom>
+          <a:solidFill>
+            <a:srgbClr val="FFFFFF">
+              <a:shade val="85000"/>
+            </a:srgbClr>
+          </a:solidFill>
+          <a:ln>
+            <a:noFill/>
+          </a:ln>
+          <a:effectLst>
+            <a:reflection blurRad="12700" stA="38000" endPos="28000" dist="5000" dir="5400000" sy="-100000" algn="bl" rotWithShape="0"/>
+          </a:effectLst>
+          <a:extLst/>
+        </p:spPr>
+      </p:pic>
+    </p:spTree>
+    <p:extLst>
+      <p:ext uri="{BB962C8B-B14F-4D97-AF65-F5344CB8AC3E}">
+        <p14:creationId xmlns:p14="http://schemas.microsoft.com/office/powerpoint/2010/main" val="2711882485"/>
       </p:ext>
     </p:extLst>
   </p:cSld>

</xml_diff>